<commit_message>
Complete 070 documents and artifacts
</commit_message>
<xml_diff>
--- a/070-BuildModernizeModernAIApps/Coach/Solutions/challenge-02/Challenge 2.pptx
+++ b/070-BuildModernizeModernAIApps/Coach/Solutions/challenge-02/Challenge 2.pptx
@@ -5,10 +5,10 @@
     <p:sldMasterId id="2147483878" r:id="rId4"/>
   </p:sldMasterIdLst>
   <p:notesMasterIdLst>
-    <p:notesMasterId r:id="rId12"/>
+    <p:notesMasterId r:id="rId11"/>
   </p:notesMasterIdLst>
   <p:handoutMasterIdLst>
-    <p:handoutMasterId r:id="rId13"/>
+    <p:handoutMasterId r:id="rId12"/>
   </p:handoutMasterIdLst>
   <p:sldIdLst>
     <p:sldId id="2076136250" r:id="rId5"/>
@@ -16,8 +16,7 @@
     <p:sldId id="2147469982" r:id="rId7"/>
     <p:sldId id="2147469983" r:id="rId8"/>
     <p:sldId id="2147469985" r:id="rId9"/>
-    <p:sldId id="2147469986" r:id="rId10"/>
-    <p:sldId id="2147469981" r:id="rId11"/>
+    <p:sldId id="2147469981" r:id="rId10"/>
   </p:sldIdLst>
   <p:sldSz cx="12192000" cy="6858000"/>
   <p:notesSz cx="6858000" cy="9144000"/>
@@ -126,7 +125,6 @@
             <p14:sldId id="2147469982"/>
             <p14:sldId id="2147469983"/>
             <p14:sldId id="2147469985"/>
-            <p14:sldId id="2147469986"/>
             <p14:sldId id="2147469981"/>
           </p14:sldIdLst>
         </p14:section>
@@ -163,137 +161,30 @@
 </p:presentation>
 </file>
 
-<file path=ppt/revisionInfo.xml><?xml version="1.0" encoding="utf-8"?>
-<p1510:revInfo xmlns:a="http://schemas.openxmlformats.org/drawingml/2006/main" xmlns:r="http://schemas.openxmlformats.org/officeDocument/2006/relationships" xmlns:p1510="http://schemas.microsoft.com/office/powerpoint/2015/10/main">
-  <p1510:revLst>
-    <p1510:client id="{C05DD55E-9564-41C6-A985-C73DDDA53159}" v="2" dt="2023-11-02T23:57:19.159"/>
-  </p1510:revLst>
-</p1510:revInfo>
-</file>
-
 <file path=ppt/changesInfos/changesInfo1.xml><?xml version="1.0" encoding="utf-8"?>
 <pc:chgInfo xmlns:a="http://schemas.openxmlformats.org/drawingml/2006/main" xmlns:r="http://schemas.openxmlformats.org/officeDocument/2006/relationships" xmlns:ac="http://schemas.microsoft.com/office/drawing/2013/main/command" xmlns:pc="http://schemas.microsoft.com/office/powerpoint/2013/main/command">
   <pc:docChgLst>
-    <pc:chgData name="Varma Gadhiraju" userId="88469f7f-f401-455b-ae9e-a032f36d81fa" providerId="ADAL" clId="{C05DD55E-9564-41C6-A985-C73DDDA53159}"/>
-    <pc:docChg chg="undo custSel addSld delSld modSld modSection">
-      <pc:chgData name="Varma Gadhiraju" userId="88469f7f-f401-455b-ae9e-a032f36d81fa" providerId="ADAL" clId="{C05DD55E-9564-41C6-A985-C73DDDA53159}" dt="2023-11-03T04:18:45.475" v="6767" actId="20577"/>
+    <pc:chgData name="Varma Gadhiraju" userId="88469f7f-f401-455b-ae9e-a032f36d81fa" providerId="ADAL" clId="{024A94E0-0284-425C-A71C-E17E609475EB}"/>
+    <pc:docChg chg="undo custSel delSld modSld modSection">
+      <pc:chgData name="Varma Gadhiraju" userId="88469f7f-f401-455b-ae9e-a032f36d81fa" providerId="ADAL" clId="{024A94E0-0284-425C-A71C-E17E609475EB}" dt="2023-11-05T03:03:17.826" v="2425" actId="20577"/>
       <pc:docMkLst>
         <pc:docMk/>
       </pc:docMkLst>
-      <pc:sldChg chg="modSp mod modNotesTx">
-        <pc:chgData name="Varma Gadhiraju" userId="88469f7f-f401-455b-ae9e-a032f36d81fa" providerId="ADAL" clId="{C05DD55E-9564-41C6-A985-C73DDDA53159}" dt="2023-11-02T23:20:02.552" v="2370" actId="1076"/>
-        <pc:sldMkLst>
-          <pc:docMk/>
-          <pc:sldMk cId="172670671" sldId="2076136250"/>
-        </pc:sldMkLst>
-        <pc:spChg chg="mod">
-          <ac:chgData name="Varma Gadhiraju" userId="88469f7f-f401-455b-ae9e-a032f36d81fa" providerId="ADAL" clId="{C05DD55E-9564-41C6-A985-C73DDDA53159}" dt="2023-11-02T23:20:02.552" v="2370" actId="1076"/>
-          <ac:spMkLst>
-            <pc:docMk/>
-            <pc:sldMk cId="172670671" sldId="2076136250"/>
-            <ac:spMk id="4" creationId="{7512C31D-C592-FCF5-6E10-83314A77B034}"/>
-          </ac:spMkLst>
-        </pc:spChg>
-        <pc:spChg chg="mod">
-          <ac:chgData name="Varma Gadhiraju" userId="88469f7f-f401-455b-ae9e-a032f36d81fa" providerId="ADAL" clId="{C05DD55E-9564-41C6-A985-C73DDDA53159}" dt="2023-11-02T23:19:56.375" v="2369" actId="1076"/>
-          <ac:spMkLst>
-            <pc:docMk/>
-            <pc:sldMk cId="172670671" sldId="2076136250"/>
-            <ac:spMk id="9" creationId="{9B601207-A802-791B-DE09-27F05A434A9C}"/>
-          </ac:spMkLst>
-        </pc:spChg>
-      </pc:sldChg>
-      <pc:sldChg chg="del">
-        <pc:chgData name="Varma Gadhiraju" userId="88469f7f-f401-455b-ae9e-a032f36d81fa" providerId="ADAL" clId="{C05DD55E-9564-41C6-A985-C73DDDA53159}" dt="2023-11-02T03:20:12.631" v="69" actId="47"/>
-        <pc:sldMkLst>
-          <pc:docMk/>
-          <pc:sldMk cId="1202072964" sldId="2076136296"/>
-        </pc:sldMkLst>
-      </pc:sldChg>
-      <pc:sldChg chg="addSp delSp modSp mod modNotesTx">
-        <pc:chgData name="Varma Gadhiraju" userId="88469f7f-f401-455b-ae9e-a032f36d81fa" providerId="ADAL" clId="{C05DD55E-9564-41C6-A985-C73DDDA53159}" dt="2023-11-03T00:18:03.410" v="5569" actId="5793"/>
-        <pc:sldMkLst>
-          <pc:docMk/>
-          <pc:sldMk cId="1641401202" sldId="2076136297"/>
-        </pc:sldMkLst>
-        <pc:spChg chg="add del mod">
-          <ac:chgData name="Varma Gadhiraju" userId="88469f7f-f401-455b-ae9e-a032f36d81fa" providerId="ADAL" clId="{C05DD55E-9564-41C6-A985-C73DDDA53159}" dt="2023-11-02T03:39:57.789" v="281"/>
-          <ac:spMkLst>
-            <pc:docMk/>
-            <pc:sldMk cId="1641401202" sldId="2076136297"/>
-            <ac:spMk id="2" creationId="{1D882702-8E20-E905-D293-1C1CBA24E5EE}"/>
-          </ac:spMkLst>
-        </pc:spChg>
-        <pc:spChg chg="mod">
-          <ac:chgData name="Varma Gadhiraju" userId="88469f7f-f401-455b-ae9e-a032f36d81fa" providerId="ADAL" clId="{C05DD55E-9564-41C6-A985-C73DDDA53159}" dt="2023-11-02T03:19:53.090" v="65" actId="20577"/>
-          <ac:spMkLst>
-            <pc:docMk/>
-            <pc:sldMk cId="1641401202" sldId="2076136297"/>
-            <ac:spMk id="4" creationId="{02C97462-A7D0-45CE-0150-E81AA4AA42EB}"/>
-          </ac:spMkLst>
-        </pc:spChg>
-        <pc:spChg chg="mod">
-          <ac:chgData name="Varma Gadhiraju" userId="88469f7f-f401-455b-ae9e-a032f36d81fa" providerId="ADAL" clId="{C05DD55E-9564-41C6-A985-C73DDDA53159}" dt="2023-11-03T00:18:03.410" v="5569" actId="5793"/>
-          <ac:spMkLst>
-            <pc:docMk/>
-            <pc:sldMk cId="1641401202" sldId="2076136297"/>
-            <ac:spMk id="5" creationId="{6F33E021-3047-07E5-4CC6-1F3BF72FAFB4}"/>
-          </ac:spMkLst>
-        </pc:spChg>
-      </pc:sldChg>
-      <pc:sldChg chg="del">
-        <pc:chgData name="Varma Gadhiraju" userId="88469f7f-f401-455b-ae9e-a032f36d81fa" providerId="ADAL" clId="{C05DD55E-9564-41C6-A985-C73DDDA53159}" dt="2023-11-02T03:20:11.231" v="67" actId="47"/>
-        <pc:sldMkLst>
-          <pc:docMk/>
-          <pc:sldMk cId="1014735227" sldId="2147469972"/>
-        </pc:sldMkLst>
-      </pc:sldChg>
-      <pc:sldChg chg="del">
-        <pc:chgData name="Varma Gadhiraju" userId="88469f7f-f401-455b-ae9e-a032f36d81fa" providerId="ADAL" clId="{C05DD55E-9564-41C6-A985-C73DDDA53159}" dt="2023-11-02T03:20:14.495" v="71" actId="47"/>
-        <pc:sldMkLst>
-          <pc:docMk/>
-          <pc:sldMk cId="3080917216" sldId="2147469973"/>
-        </pc:sldMkLst>
-      </pc:sldChg>
-      <pc:sldChg chg="modSp mod modNotesTx">
-        <pc:chgData name="Varma Gadhiraju" userId="88469f7f-f401-455b-ae9e-a032f36d81fa" providerId="ADAL" clId="{C05DD55E-9564-41C6-A985-C73DDDA53159}" dt="2023-11-02T23:59:21.935" v="4600" actId="20577"/>
+      <pc:sldChg chg="modNotesTx">
+        <pc:chgData name="Varma Gadhiraju" userId="88469f7f-f401-455b-ae9e-a032f36d81fa" providerId="ADAL" clId="{024A94E0-0284-425C-A71C-E17E609475EB}" dt="2023-11-05T02:46:18.321" v="905" actId="20577"/>
         <pc:sldMkLst>
           <pc:docMk/>
           <pc:sldMk cId="2189777577" sldId="2147469982"/>
         </pc:sldMkLst>
-        <pc:spChg chg="mod">
-          <ac:chgData name="Varma Gadhiraju" userId="88469f7f-f401-455b-ae9e-a032f36d81fa" providerId="ADAL" clId="{C05DD55E-9564-41C6-A985-C73DDDA53159}" dt="2023-11-02T12:09:35.006" v="1089" actId="20577"/>
-          <ac:spMkLst>
-            <pc:docMk/>
-            <pc:sldMk cId="2189777577" sldId="2147469982"/>
-            <ac:spMk id="2" creationId="{5F65777E-1E25-7E2B-494D-21837C16912B}"/>
-          </ac:spMkLst>
-        </pc:spChg>
-        <pc:spChg chg="mod">
-          <ac:chgData name="Varma Gadhiraju" userId="88469f7f-f401-455b-ae9e-a032f36d81fa" providerId="ADAL" clId="{C05DD55E-9564-41C6-A985-C73DDDA53159}" dt="2023-11-02T23:54:07.193" v="4070"/>
-          <ac:spMkLst>
-            <pc:docMk/>
-            <pc:sldMk cId="2189777577" sldId="2147469982"/>
-            <ac:spMk id="3" creationId="{46982CB1-256E-6CC5-294D-F1E6CA92938F}"/>
-          </ac:spMkLst>
-        </pc:spChg>
       </pc:sldChg>
-      <pc:sldChg chg="modSp new mod modNotesTx">
-        <pc:chgData name="Varma Gadhiraju" userId="88469f7f-f401-455b-ae9e-a032f36d81fa" providerId="ADAL" clId="{C05DD55E-9564-41C6-A985-C73DDDA53159}" dt="2023-11-03T00:40:01.417" v="6752" actId="33524"/>
+      <pc:sldChg chg="modSp mod modNotesTx">
+        <pc:chgData name="Varma Gadhiraju" userId="88469f7f-f401-455b-ae9e-a032f36d81fa" providerId="ADAL" clId="{024A94E0-0284-425C-A71C-E17E609475EB}" dt="2023-11-05T03:03:17.826" v="2425" actId="20577"/>
         <pc:sldMkLst>
           <pc:docMk/>
           <pc:sldMk cId="85133228" sldId="2147469983"/>
         </pc:sldMkLst>
         <pc:spChg chg="mod">
-          <ac:chgData name="Varma Gadhiraju" userId="88469f7f-f401-455b-ae9e-a032f36d81fa" providerId="ADAL" clId="{C05DD55E-9564-41C6-A985-C73DDDA53159}" dt="2023-11-02T12:20:03.660" v="1343" actId="20577"/>
-          <ac:spMkLst>
-            <pc:docMk/>
-            <pc:sldMk cId="85133228" sldId="2147469983"/>
-            <ac:spMk id="2" creationId="{2084F318-FB58-F84F-D5AB-C0966D650B50}"/>
-          </ac:spMkLst>
-        </pc:spChg>
-        <pc:spChg chg="mod">
-          <ac:chgData name="Varma Gadhiraju" userId="88469f7f-f401-455b-ae9e-a032f36d81fa" providerId="ADAL" clId="{C05DD55E-9564-41C6-A985-C73DDDA53159}" dt="2023-11-03T00:33:15.036" v="5576" actId="12"/>
+          <ac:chgData name="Varma Gadhiraju" userId="88469f7f-f401-455b-ae9e-a032f36d81fa" providerId="ADAL" clId="{024A94E0-0284-425C-A71C-E17E609475EB}" dt="2023-11-05T02:58:07.970" v="1646" actId="21"/>
           <ac:spMkLst>
             <pc:docMk/>
             <pc:sldMk cId="85133228" sldId="2147469983"/>
@@ -302,122 +193,10 @@
         </pc:spChg>
       </pc:sldChg>
       <pc:sldChg chg="del">
-        <pc:chgData name="Varma Gadhiraju" userId="88469f7f-f401-455b-ae9e-a032f36d81fa" providerId="ADAL" clId="{C05DD55E-9564-41C6-A985-C73DDDA53159}" dt="2023-11-02T03:20:11.944" v="68" actId="47"/>
-        <pc:sldMkLst>
-          <pc:docMk/>
-          <pc:sldMk cId="3155825315" sldId="2147469983"/>
-        </pc:sldMkLst>
-      </pc:sldChg>
-      <pc:sldChg chg="modSp new del mod">
-        <pc:chgData name="Varma Gadhiraju" userId="88469f7f-f401-455b-ae9e-a032f36d81fa" providerId="ADAL" clId="{C05DD55E-9564-41C6-A985-C73DDDA53159}" dt="2023-11-02T12:47:26.195" v="2108" actId="47"/>
-        <pc:sldMkLst>
-          <pc:docMk/>
-          <pc:sldMk cId="3693105762" sldId="2147469984"/>
-        </pc:sldMkLst>
-        <pc:spChg chg="mod">
-          <ac:chgData name="Varma Gadhiraju" userId="88469f7f-f401-455b-ae9e-a032f36d81fa" providerId="ADAL" clId="{C05DD55E-9564-41C6-A985-C73DDDA53159}" dt="2023-11-02T03:20:52.932" v="117" actId="20577"/>
-          <ac:spMkLst>
-            <pc:docMk/>
-            <pc:sldMk cId="3693105762" sldId="2147469984"/>
-            <ac:spMk id="2" creationId="{19834954-25DC-2C37-645D-3C5D9E0FD1FA}"/>
-          </ac:spMkLst>
-        </pc:spChg>
-      </pc:sldChg>
-      <pc:sldChg chg="del">
-        <pc:chgData name="Varma Gadhiraju" userId="88469f7f-f401-455b-ae9e-a032f36d81fa" providerId="ADAL" clId="{C05DD55E-9564-41C6-A985-C73DDDA53159}" dt="2023-11-02T03:20:13.350" v="70" actId="47"/>
-        <pc:sldMkLst>
-          <pc:docMk/>
-          <pc:sldMk cId="541320992" sldId="2147469985"/>
-        </pc:sldMkLst>
-      </pc:sldChg>
-      <pc:sldChg chg="delSp modSp new mod">
-        <pc:chgData name="Varma Gadhiraju" userId="88469f7f-f401-455b-ae9e-a032f36d81fa" providerId="ADAL" clId="{C05DD55E-9564-41C6-A985-C73DDDA53159}" dt="2023-11-02T12:47:30.665" v="2109" actId="478"/>
-        <pc:sldMkLst>
-          <pc:docMk/>
-          <pc:sldMk cId="2540589977" sldId="2147469985"/>
-        </pc:sldMkLst>
-        <pc:spChg chg="mod">
-          <ac:chgData name="Varma Gadhiraju" userId="88469f7f-f401-455b-ae9e-a032f36d81fa" providerId="ADAL" clId="{C05DD55E-9564-41C6-A985-C73DDDA53159}" dt="2023-11-02T03:21:03.496" v="124" actId="20577"/>
-          <ac:spMkLst>
-            <pc:docMk/>
-            <pc:sldMk cId="2540589977" sldId="2147469985"/>
-            <ac:spMk id="2" creationId="{71CC00D6-BA64-A10A-056B-A6BF61FC7DC8}"/>
-          </ac:spMkLst>
-        </pc:spChg>
-        <pc:spChg chg="del">
-          <ac:chgData name="Varma Gadhiraju" userId="88469f7f-f401-455b-ae9e-a032f36d81fa" providerId="ADAL" clId="{C05DD55E-9564-41C6-A985-C73DDDA53159}" dt="2023-11-02T12:47:30.665" v="2109" actId="478"/>
-          <ac:spMkLst>
-            <pc:docMk/>
-            <pc:sldMk cId="2540589977" sldId="2147469985"/>
-            <ac:spMk id="3" creationId="{18F90E5A-39D6-D69C-4B75-649B66948FB4}"/>
-          </ac:spMkLst>
-        </pc:spChg>
-      </pc:sldChg>
-      <pc:sldChg chg="addSp delSp modSp new mod">
-        <pc:chgData name="Varma Gadhiraju" userId="88469f7f-f401-455b-ae9e-a032f36d81fa" providerId="ADAL" clId="{C05DD55E-9564-41C6-A985-C73DDDA53159}" dt="2023-11-03T04:18:45.475" v="6767" actId="20577"/>
+        <pc:chgData name="Varma Gadhiraju" userId="88469f7f-f401-455b-ae9e-a032f36d81fa" providerId="ADAL" clId="{024A94E0-0284-425C-A71C-E17E609475EB}" dt="2023-11-05T02:30:25.414" v="893" actId="47"/>
         <pc:sldMkLst>
           <pc:docMk/>
           <pc:sldMk cId="1720178716" sldId="2147469986"/>
-        </pc:sldMkLst>
-        <pc:spChg chg="mod">
-          <ac:chgData name="Varma Gadhiraju" userId="88469f7f-f401-455b-ae9e-a032f36d81fa" providerId="ADAL" clId="{C05DD55E-9564-41C6-A985-C73DDDA53159}" dt="2023-11-03T04:18:45.475" v="6767" actId="20577"/>
-          <ac:spMkLst>
-            <pc:docMk/>
-            <pc:sldMk cId="1720178716" sldId="2147469986"/>
-            <ac:spMk id="2" creationId="{7D8D856E-EA3A-69F8-8314-B6BA9F63A366}"/>
-          </ac:spMkLst>
-        </pc:spChg>
-        <pc:spChg chg="mod">
-          <ac:chgData name="Varma Gadhiraju" userId="88469f7f-f401-455b-ae9e-a032f36d81fa" providerId="ADAL" clId="{C05DD55E-9564-41C6-A985-C73DDDA53159}" dt="2023-11-03T04:18:31.762" v="6757"/>
-          <ac:spMkLst>
-            <pc:docMk/>
-            <pc:sldMk cId="1720178716" sldId="2147469986"/>
-            <ac:spMk id="3" creationId="{B6AD5848-BE06-4F51-059F-8680CA5E35E0}"/>
-          </ac:spMkLst>
-        </pc:spChg>
-        <pc:spChg chg="add del">
-          <ac:chgData name="Varma Gadhiraju" userId="88469f7f-f401-455b-ae9e-a032f36d81fa" providerId="ADAL" clId="{C05DD55E-9564-41C6-A985-C73DDDA53159}" dt="2023-11-02T22:58:10.809" v="2112" actId="22"/>
-          <ac:spMkLst>
-            <pc:docMk/>
-            <pc:sldMk cId="1720178716" sldId="2147469986"/>
-            <ac:spMk id="5" creationId="{3D58CFAD-BE3B-D3A1-FEBF-8A26B15AB07B}"/>
-          </ac:spMkLst>
-        </pc:spChg>
-        <pc:spChg chg="add del">
-          <ac:chgData name="Varma Gadhiraju" userId="88469f7f-f401-455b-ae9e-a032f36d81fa" providerId="ADAL" clId="{C05DD55E-9564-41C6-A985-C73DDDA53159}" dt="2023-11-03T04:18:29.056" v="6754" actId="22"/>
-          <ac:spMkLst>
-            <pc:docMk/>
-            <pc:sldMk cId="1720178716" sldId="2147469986"/>
-            <ac:spMk id="7" creationId="{A2E222F4-089F-AFA2-426F-9C5B129B2BD3}"/>
-          </ac:spMkLst>
-        </pc:spChg>
-      </pc:sldChg>
-      <pc:sldChg chg="del">
-        <pc:chgData name="Varma Gadhiraju" userId="88469f7f-f401-455b-ae9e-a032f36d81fa" providerId="ADAL" clId="{C05DD55E-9564-41C6-A985-C73DDDA53159}" dt="2023-11-02T03:20:15.168" v="72" actId="47"/>
-        <pc:sldMkLst>
-          <pc:docMk/>
-          <pc:sldMk cId="723504948" sldId="2147469987"/>
-        </pc:sldMkLst>
-      </pc:sldChg>
-      <pc:sldChg chg="del">
-        <pc:chgData name="Varma Gadhiraju" userId="88469f7f-f401-455b-ae9e-a032f36d81fa" providerId="ADAL" clId="{C05DD55E-9564-41C6-A985-C73DDDA53159}" dt="2023-11-02T03:20:10.408" v="66" actId="47"/>
-        <pc:sldMkLst>
-          <pc:docMk/>
-          <pc:sldMk cId="201057222" sldId="2147469988"/>
-        </pc:sldMkLst>
-      </pc:sldChg>
-      <pc:sldChg chg="del">
-        <pc:chgData name="Varma Gadhiraju" userId="88469f7f-f401-455b-ae9e-a032f36d81fa" providerId="ADAL" clId="{C05DD55E-9564-41C6-A985-C73DDDA53159}" dt="2023-11-02T03:20:16.150" v="73" actId="47"/>
-        <pc:sldMkLst>
-          <pc:docMk/>
-          <pc:sldMk cId="1931468004" sldId="2147469989"/>
-        </pc:sldMkLst>
-      </pc:sldChg>
-      <pc:sldChg chg="del">
-        <pc:chgData name="Varma Gadhiraju" userId="88469f7f-f401-455b-ae9e-a032f36d81fa" providerId="ADAL" clId="{C05DD55E-9564-41C6-A985-C73DDDA53159}" dt="2023-11-02T03:20:17.195" v="74" actId="47"/>
-        <pc:sldMkLst>
-          <pc:docMk/>
-          <pc:sldMk cId="378137015" sldId="2147469990"/>
         </pc:sldMkLst>
       </pc:sldChg>
     </pc:docChg>
@@ -519,7 +298,7 @@
           <a:p>
             <a:fld id="{5DC6FE6B-C416-4AB4-9C30-FB2A7099CAC6}" type="datetimeFigureOut">
               <a:rPr lang="en-US" smtClean="0"/>
-              <a:t>11/2/2023</a:t>
+              <a:t>11/5/2023</a:t>
             </a:fld>
             <a:endParaRPr lang="en-US"/>
           </a:p>
@@ -696,7 +475,7 @@
           <a:p>
             <a:fld id="{CFF76AD5-84B7-47FE-802A-FFAE792CDC84}" type="datetimeFigureOut">
               <a:rPr lang="en-US" smtClean="0"/>
-              <a:t>11/2/2023</a:t>
+              <a:t>11/5/2023</a:t>
             </a:fld>
             <a:endParaRPr lang="en-US"/>
           </a:p>
@@ -1009,7 +788,7 @@
           <a:p>
             <a:r>
               <a:rPr lang="en-US" dirty="0"/>
-              <a:t>Hello. Today I’m going to walk you through the Challenge-2 of the Build and Modernize AI Applications Hackathon for the Vector Search &amp; AI Assistant solution accelerator.</a:t>
+              <a:t>Hello Everyone. I’m going to walk you through the Challenge-3 of the Build and Modernize AI Applications Hackathon for the Vector Search &amp; AI Assistant solution accelerator.</a:t>
             </a:r>
           </a:p>
           <a:p>
@@ -1018,7 +797,7 @@
           <a:p>
             <a:r>
               <a:rPr lang="en-US" dirty="0"/>
-              <a:t>This is the train the trainer video for Challenge 2 : It’s all about the payload</a:t>
+              <a:t>This is the train the trainer video for Challenge 3 : Now we’re Flying!</a:t>
             </a:r>
           </a:p>
           <a:p>
@@ -1027,7 +806,7 @@
           <a:p>
             <a:r>
               <a:rPr lang="en-US" dirty="0"/>
-              <a:t>In this video, I’m going to walk you through the configuration and code changes required to solve the objectives of Challenge-2. Throughout the video I will highlight key pieces of knowledge to help you as you coach users through this challenge in the hackathon.</a:t>
+              <a:t>In this video, I’m going to walk you through the configuration and code changes required to solve the objectives of Challenge-3. </a:t>
             </a:r>
           </a:p>
           <a:p>
@@ -1198,7 +977,7 @@
           <a:p>
             <a:r>
               <a:rPr lang="en-US" dirty="0"/>
-              <a:t>Lets looks at the objectives for challenge-2.</a:t>
+              <a:t>Let’s go over the objectives for challenge-3.</a:t>
             </a:r>
           </a:p>
           <a:p>
@@ -1206,123 +985,77 @@
           </a:p>
           <a:p>
             <a:r>
-              <a:rPr lang="en-US" dirty="0"/>
-              <a:t>In this challenge-2, we are going to help </a:t>
-            </a:r>
-            <a:r>
-              <a:rPr lang="en-US" dirty="0" err="1"/>
-              <a:t>CosmicWorks</a:t>
-            </a:r>
-            <a:r>
-              <a:rPr lang="en-US" dirty="0"/>
-              <a:t> takes their years worth of customer and product data and store it in a way it can be searched through a chat interface by their end users. They also want to make use of Vector based search rather than a key-word based search to make it more effective. </a:t>
-            </a:r>
-          </a:p>
-          <a:p>
-            <a:endParaRPr lang="en-US" dirty="0"/>
-          </a:p>
-          <a:p>
-            <a:r>
-              <a:rPr lang="en-US" dirty="0"/>
-              <a:t>To accomplish the goal, we will use the data located in a blob storage account given to us by </a:t>
-            </a:r>
-            <a:r>
-              <a:rPr lang="en-US" dirty="0" err="1"/>
-              <a:t>CosmicWorks</a:t>
-            </a:r>
-            <a:r>
-              <a:rPr lang="en-US" dirty="0"/>
-              <a:t>, and we will use the </a:t>
-            </a:r>
-            <a:r>
-              <a:rPr lang="en-US" dirty="0" err="1"/>
+              <a:rPr lang="en-GB" b="0" i="0" dirty="0">
+                <a:solidFill>
+                  <a:srgbClr val="ADBAC7"/>
+                </a:solidFill>
+                <a:effectLst/>
+                <a:latin typeface="-apple-system"/>
+              </a:rPr>
+              <a:t>With the critical components in place, we're ready to tie everything into the chat interface. When a user types a question into the chat interface, we need to create a vector embedding for the question, then search for the most similar vector embeddings for products and accounts, and return the relevant documents that get sent to Azure OpenAI's completions endpoint.</a:t>
+            </a:r>
+          </a:p>
+          <a:p>
+            <a:endParaRPr lang="en-GB" b="0" i="0" dirty="0">
+              <a:solidFill>
+                <a:srgbClr val="ADBAC7"/>
+              </a:solidFill>
+              <a:effectLst/>
+              <a:latin typeface="-apple-system"/>
+            </a:endParaRPr>
+          </a:p>
+          <a:p>
+            <a:r>
+              <a:rPr lang="en-GB" b="0" i="0" dirty="0">
+                <a:solidFill>
+                  <a:srgbClr val="ADBAC7"/>
+                </a:solidFill>
+                <a:effectLst/>
+                <a:latin typeface="-apple-system"/>
+              </a:rPr>
+              <a:t>We are going to use the completion endpoint of the Azure OpenAI Gpt-35-turbo model to generate conversational responses. We also need to store the chat interactions in </a:t>
+            </a:r>
+            <a:r>
+              <a:rPr lang="en-GB" b="0" i="0" dirty="0" err="1">
+                <a:solidFill>
+                  <a:srgbClr val="ADBAC7"/>
+                </a:solidFill>
+                <a:effectLst/>
+                <a:latin typeface="-apple-system"/>
+              </a:rPr>
               <a:t>CosmosDB</a:t>
             </a:r>
             <a:r>
-              <a:rPr lang="en-US" dirty="0"/>
-              <a:t> Data Migration tool to load the data into </a:t>
-            </a:r>
-            <a:r>
-              <a:rPr lang="en-US" dirty="0" err="1"/>
-              <a:t>Cosmosdb</a:t>
-            </a:r>
-            <a:r>
-              <a:rPr lang="en-US" dirty="0"/>
-              <a:t> container.</a:t>
-            </a:r>
-          </a:p>
-          <a:p>
-            <a:endParaRPr lang="en-US" dirty="0"/>
-          </a:p>
-          <a:p>
-            <a:r>
-              <a:rPr lang="en-US" dirty="0"/>
-              <a:t>Next, we need to create an Index in Cognitive Search with configurations appropriate to store the embeddings of customer and product details stored in </a:t>
-            </a:r>
-            <a:r>
-              <a:rPr lang="en-US" dirty="0" err="1"/>
-              <a:t>Cosmosdb</a:t>
-            </a:r>
-            <a:r>
-              <a:rPr lang="en-US" dirty="0"/>
-              <a:t>. Once the index is created, we need to configure a </a:t>
-            </a:r>
-            <a:r>
-              <a:rPr lang="en-US" dirty="0" err="1"/>
-              <a:t>changefeed</a:t>
-            </a:r>
-            <a:r>
-              <a:rPr lang="en-US" dirty="0"/>
-              <a:t> on the customer and product collections to generate the vector embeddings and store them in the index.</a:t>
-            </a:r>
-          </a:p>
-          <a:p>
-            <a:endParaRPr lang="en-US" dirty="0"/>
-          </a:p>
-          <a:p>
-            <a:r>
-              <a:rPr lang="en-US" dirty="0"/>
-              <a:t>These embeddings will then be used to support the chat interactions we will build in the next challenges. </a:t>
-            </a:r>
-          </a:p>
-          <a:p>
-            <a:endParaRPr lang="en-US" dirty="0"/>
-          </a:p>
-          <a:p>
-            <a:r>
-              <a:rPr lang="en-US" dirty="0"/>
-              <a:t>Finally, validate the records in </a:t>
-            </a:r>
-            <a:r>
-              <a:rPr lang="en-US" dirty="0" err="1"/>
-              <a:t>cosmosdb</a:t>
-            </a:r>
-            <a:r>
-              <a:rPr lang="en-US" dirty="0"/>
-              <a:t> and the index after the exercise is complete.</a:t>
-            </a:r>
-          </a:p>
-          <a:p>
-            <a:endParaRPr lang="en-US" dirty="0"/>
-          </a:p>
-          <a:p>
-            <a:r>
-              <a:rPr lang="en-US" dirty="0"/>
-              <a:t>As a trainer, you need to review and </a:t>
-            </a:r>
-            <a:r>
-              <a:rPr lang="en-US" dirty="0" err="1"/>
-              <a:t>famialirise</a:t>
-            </a:r>
-            <a:r>
-              <a:rPr lang="en-US" dirty="0"/>
-              <a:t> yourself with the objectives and hints provided in the challenge repo for the participants. You can find them here. </a:t>
-            </a:r>
-          </a:p>
-          <a:p>
-            <a:endParaRPr lang="en-US" dirty="0"/>
-          </a:p>
-          <a:p>
+              <a:rPr lang="en-GB" b="0" i="0" dirty="0">
+                <a:solidFill>
+                  <a:srgbClr val="ADBAC7"/>
+                </a:solidFill>
+                <a:effectLst/>
+                <a:latin typeface="-apple-system"/>
+              </a:rPr>
+              <a:t> so we can load them in the future.</a:t>
+            </a:r>
+          </a:p>
+          <a:p>
+            <a:endParaRPr lang="en-GB" b="0" i="0" dirty="0">
+              <a:solidFill>
+                <a:srgbClr val="ADBAC7"/>
+              </a:solidFill>
+              <a:effectLst/>
+              <a:latin typeface="-apple-system"/>
+            </a:endParaRPr>
+          </a:p>
+          <a:p>
+            <a:r>
+              <a:rPr lang="en-GB" b="0" i="0" dirty="0">
+                <a:solidFill>
+                  <a:srgbClr val="ADBAC7"/>
+                </a:solidFill>
+                <a:effectLst/>
+                <a:latin typeface="-apple-system"/>
+              </a:rPr>
+              <a:t>Once we are done with stitching the necessary components together, we will experiment with prompt engineering to see how the responses vary based on the prompt instructions. This is the main objective of this challenge. </a:t>
+            </a:r>
             <a:endParaRPr lang="en-US" dirty="0"/>
           </a:p>
         </p:txBody>
@@ -1409,7 +1142,13 @@
           <a:p>
             <a:r>
               <a:rPr lang="en-US" dirty="0"/>
-              <a:t>Before you or an attendee gets started with this hackathon the following prerequisites are required. This includes:</a:t>
+              <a:t>Before you or an attendee gets started with this hackathon the following prerequisites are required. </a:t>
+            </a:r>
+          </a:p>
+          <a:p>
+            <a:r>
+              <a:rPr lang="en-US" dirty="0"/>
+              <a:t>As mentioned, the main learning objective of this challenge is to introduce you to prompt engineering, take a look at the resource provided to understand more about constructing effective prompts.</a:t>
             </a:r>
           </a:p>
           <a:p>
@@ -1418,83 +1157,15 @@
           <a:p>
             <a:r>
               <a:rPr lang="en-US" dirty="0"/>
-              <a:t>Note: this hackathon assumes the attendee not only has the prerequisites required to participate in this hackathon but experience and is comfortable using these or otherwise is familiar writing code and developing applications.</a:t>
-            </a:r>
-          </a:p>
-          <a:p>
-            <a:endParaRPr lang="en-US" dirty="0"/>
-          </a:p>
-          <a:p>
+              <a:t>Memories, is an important topic to understand the flow of this solution – In this case we are using </a:t>
+            </a:r>
+            <a:r>
+              <a:rPr lang="en-US" dirty="0" err="1"/>
+              <a:t>CognitiveSearch</a:t>
+            </a:r>
             <a:r>
               <a:rPr lang="en-US" dirty="0"/>
-              <a:t>First, familiarize yourself with the </a:t>
-            </a:r>
-            <a:r>
-              <a:rPr lang="en-US" dirty="0" err="1"/>
-              <a:t>Cosmosdb</a:t>
-            </a:r>
-            <a:r>
-              <a:rPr lang="en-US" dirty="0"/>
-              <a:t> Data Migration tool, because we will use this to load the data into </a:t>
-            </a:r>
-            <a:r>
-              <a:rPr lang="en-US" dirty="0" err="1"/>
-              <a:t>Cosmosdb</a:t>
-            </a:r>
-            <a:r>
-              <a:rPr lang="en-US" dirty="0"/>
-              <a:t>. </a:t>
-            </a:r>
-          </a:p>
-          <a:p>
-            <a:endParaRPr lang="en-US" dirty="0"/>
-          </a:p>
-          <a:p>
-            <a:r>
-              <a:rPr lang="en-US" dirty="0"/>
-              <a:t>Next, Semantic Kernel – Semantic Kernel is an Open-Source SDK from Microsoft to enable orchestration between LLM endpoints and Application layer to build co-pilot experiences. We will use this SDK to build the end-to-end chat application for this hackathon. </a:t>
-            </a:r>
-          </a:p>
-          <a:p>
-            <a:endParaRPr lang="en-US" dirty="0"/>
-          </a:p>
-          <a:p>
-            <a:r>
-              <a:rPr lang="en-US" dirty="0"/>
-              <a:t>Cognitive Search is used as Vector Store for this Hackathon, Read about how to configure an Index to support vector capabilities. </a:t>
-            </a:r>
-          </a:p>
-          <a:p>
-            <a:endParaRPr lang="en-US" dirty="0"/>
-          </a:p>
-          <a:p>
-            <a:r>
-              <a:rPr lang="en-US" dirty="0"/>
-              <a:t>Finally, </a:t>
-            </a:r>
-            <a:r>
-              <a:rPr lang="en-US" dirty="0" err="1"/>
-              <a:t>changefeed</a:t>
-            </a:r>
-            <a:r>
-              <a:rPr lang="en-US" dirty="0"/>
-              <a:t> in </a:t>
-            </a:r>
-            <a:r>
-              <a:rPr lang="en-US" dirty="0" err="1"/>
-              <a:t>cosmosdb</a:t>
-            </a:r>
-            <a:r>
-              <a:rPr lang="en-US" dirty="0"/>
-              <a:t> is used to track and listen to any record level changes in a container so we can distribute those records to downstream applications for processing. In this case, </a:t>
-            </a:r>
-            <a:r>
-              <a:rPr lang="en-US" dirty="0" err="1"/>
-              <a:t>changefeed</a:t>
-            </a:r>
-            <a:r>
-              <a:rPr lang="en-US" dirty="0"/>
-              <a:t> passes the records to Semantic Kernel RAG implementation to generate embedding for each of the record and store them in the Cognitive Search Index.</a:t>
+              <a:t> Index as a memory to store and retrieve our documents for context . </a:t>
             </a:r>
           </a:p>
         </p:txBody>
@@ -1580,8 +1251,8 @@
           <a:lstStyle/>
           <a:p>
             <a:r>
-              <a:rPr lang="en-US" dirty="0"/>
-              <a:t>To complete this challenge, you need to perform 3 steps.</a:t>
+              <a:rPr lang="en-GB" dirty="0"/>
+              <a:t>Lets look at the Steps you need to perform to solve this challenge.</a:t>
             </a:r>
           </a:p>
           <a:p>
@@ -1589,70 +1260,12 @@
           </a:p>
           <a:p>
             <a:r>
-              <a:rPr lang="en-US" dirty="0"/>
-              <a:t>First, download and configure the Data Migration tool – Once downloaded, locate the </a:t>
-            </a:r>
-            <a:r>
-              <a:rPr lang="en-US" dirty="0" err="1"/>
-              <a:t>migrationsetting.template.json</a:t>
-            </a:r>
-            <a:r>
-              <a:rPr lang="en-US" dirty="0"/>
-              <a:t> file in the DMT folder. Replace the contents of this file with the sample file provided in the challenge repo. Before you run the tool, you need to replace the </a:t>
-            </a:r>
-            <a:r>
-              <a:rPr lang="en-US" dirty="0" err="1"/>
-              <a:t>Cosmosdb</a:t>
-            </a:r>
-            <a:r>
-              <a:rPr lang="en-US" dirty="0"/>
-              <a:t> connection string value with the connection string of the </a:t>
-            </a:r>
-            <a:r>
-              <a:rPr lang="en-US" dirty="0" err="1"/>
-              <a:t>Cosmosdb</a:t>
-            </a:r>
-            <a:r>
-              <a:rPr lang="en-US" dirty="0"/>
-              <a:t> service deployed as part of Challenge-1</a:t>
-            </a:r>
-          </a:p>
-          <a:p>
-            <a:endParaRPr lang="en-US" dirty="0"/>
-          </a:p>
-          <a:p>
-            <a:r>
-              <a:rPr lang="en-US" dirty="0"/>
-              <a:t>Next, to create the cognitive search index, you need to complete the code sections in the </a:t>
+              <a:rPr lang="en-US" sz="1200" i="1" dirty="0"/>
+              <a:t>First, specify how the memory or context and System message needs to be formatted with the given instructions. Also, add the user and system messages to the chat history object with a specific role. You need to do this by completing the code in </a:t>
             </a:r>
             <a:r>
               <a:rPr lang="en-US" sz="1200" i="1" dirty="0" err="1"/>
-              <a:t>AzureCognitiveSearchVectorMemory.cs</a:t>
-            </a:r>
-            <a:r>
-              <a:rPr lang="en-US" sz="1200" i="1" dirty="0"/>
-              <a:t>, this is located in the </a:t>
-            </a:r>
-            <a:r>
-              <a:rPr lang="en-US" sz="1200" i="1" dirty="0" err="1"/>
-              <a:t>VectorSearchAiAssistant.SemanticKernel</a:t>
-            </a:r>
-            <a:r>
-              <a:rPr lang="en-US" sz="1200" i="1" dirty="0"/>
-              <a:t> project of the solution you have open in Visual Studio for debugging.</a:t>
-            </a:r>
-          </a:p>
-          <a:p>
-            <a:endParaRPr lang="en-US" sz="1200" i="1" dirty="0"/>
-          </a:p>
-          <a:p>
-            <a:r>
-              <a:rPr lang="en-US" sz="1200" i="1" dirty="0"/>
-              <a:t>Finally, to enable change feed to read all the loaded documents in customer and product collections, you need to complete the code in </a:t>
-            </a:r>
-            <a:r>
-              <a:rPr lang="en-US" sz="1200" i="1" dirty="0" err="1"/>
-              <a:t>ComosDbService.cs</a:t>
+              <a:t>ChatBuilder.cs</a:t>
             </a:r>
             <a:r>
               <a:rPr lang="en-US" sz="1200" i="1" dirty="0"/>
@@ -1660,7 +1273,7 @@
             </a:r>
             <a:r>
               <a:rPr lang="en-US" sz="1200" i="1" dirty="0" err="1"/>
-              <a:t>VectorSearchAIAssistant.Service</a:t>
+              <a:t>SemanticKernel</a:t>
             </a:r>
             <a:r>
               <a:rPr lang="en-US" sz="1200" i="1" dirty="0"/>
@@ -1673,7 +1286,58 @@
           <a:p>
             <a:r>
               <a:rPr lang="en-US" sz="1200" i="1" dirty="0"/>
-              <a:t>Let's see a demo of how to complete these 3 steps to complete the challenge.</a:t>
+              <a:t>Next, Complete the code in </a:t>
+            </a:r>
+            <a:r>
+              <a:rPr lang="en-US" sz="1200" i="1" dirty="0" err="1"/>
+              <a:t>ChatService.cs</a:t>
+            </a:r>
+            <a:r>
+              <a:rPr lang="en-US" sz="1200" i="1" dirty="0"/>
+              <a:t> file in the Service project to receive a prompt from the user, vectorize it using OpenAI embedding model, retrieve the context from the Vector index and then get a completion from the chat model. You will also store the conversation as history in </a:t>
+            </a:r>
+            <a:r>
+              <a:rPr lang="en-US" sz="1200" i="1" dirty="0" err="1"/>
+              <a:t>comosdb</a:t>
+            </a:r>
+            <a:r>
+              <a:rPr lang="en-US" sz="1200" i="1" dirty="0"/>
+              <a:t> completions collection.</a:t>
+            </a:r>
+          </a:p>
+          <a:p>
+            <a:endParaRPr lang="en-US" sz="1200" i="1" dirty="0"/>
+          </a:p>
+          <a:p>
+            <a:r>
+              <a:rPr lang="en-US" sz="1200" i="1" dirty="0"/>
+              <a:t>We will also complete the code in </a:t>
+            </a:r>
+            <a:r>
+              <a:rPr lang="en-US" sz="1200" i="1" dirty="0" err="1"/>
+              <a:t>SemanticKernelRAGService.cs</a:t>
+            </a:r>
+            <a:r>
+              <a:rPr lang="en-US" sz="1200" i="1" dirty="0"/>
+              <a:t> file in the same project to initiate the actions discussed earlier and then create a result to display in the user interface. </a:t>
+            </a:r>
+          </a:p>
+          <a:p>
+            <a:endParaRPr lang="en-US" sz="1200" i="1" dirty="0"/>
+          </a:p>
+          <a:p>
+            <a:r>
+              <a:rPr lang="en-US" sz="1200" i="1" dirty="0"/>
+              <a:t>Finally, you will use the prompt template provided in the repo and modify it to meet the requirements of the challenge. You can experiment with different prompts to see how the quality or relevance of the responses change.</a:t>
+            </a:r>
+          </a:p>
+          <a:p>
+            <a:endParaRPr lang="en-US" sz="1200" i="1" dirty="0"/>
+          </a:p>
+          <a:p>
+            <a:r>
+              <a:rPr lang="en-US" sz="1200" i="1" dirty="0"/>
+              <a:t>Let's see a demo of how to complete these steps to complete the challenge.</a:t>
             </a:r>
           </a:p>
           <a:p>
@@ -1794,7 +1458,7 @@
           <a:p>
             <a:fld id="{CCB0B7A7-645F-45EF-A82D-25C8E51FB344}" type="slidenum">
               <a:rPr lang="en-US" smtClean="0"/>
-              <a:t>7</a:t>
+              <a:t>6</a:t>
             </a:fld>
             <a:endParaRPr lang="en-US"/>
           </a:p>
@@ -12581,7 +12245,7 @@
           <a:p>
             <a:fld id="{E99080E2-161E-4461-9006-6F8BF1776BE3}" type="datetime1">
               <a:rPr lang="en-US" smtClean="0"/>
-              <a:t>11/2/2023</a:t>
+              <a:t>11/5/2023</a:t>
             </a:fld>
             <a:endParaRPr lang="en-US"/>
           </a:p>
@@ -12694,7 +12358,7 @@
           <a:p>
             <a:fld id="{643E9E83-8A79-40C0-9FE5-E30ED9EDC2DE}" type="datetime1">
               <a:rPr lang="en-US" smtClean="0"/>
-              <a:t>11/2/2023</a:t>
+              <a:t>11/5/2023</a:t>
             </a:fld>
             <a:endParaRPr lang="en-US"/>
           </a:p>
@@ -16594,7 +16258,7 @@
           <a:p>
             <a:r>
               <a:rPr lang="en-US" dirty="0"/>
-              <a:t>Challenge 2: It’s all about the payload</a:t>
+              <a:t>Challenge 3: Now we’re Flying</a:t>
             </a:r>
           </a:p>
         </p:txBody>
@@ -16688,7 +16352,7 @@
         <p:spPr>
           <a:xfrm>
             <a:off x="586390" y="1434370"/>
-            <a:ext cx="11018520" cy="5589222"/>
+            <a:ext cx="11018520" cy="5256824"/>
           </a:xfrm>
         </p:spPr>
         <p:txBody>
@@ -16697,7 +16361,7 @@
           <a:p>
             <a:r>
               <a:rPr lang="en-US" dirty="0"/>
-              <a:t>Let’s get to loading the data and building an Index</a:t>
+              <a:t>Let’s integrate the chat components and prompt engineering</a:t>
             </a:r>
           </a:p>
           <a:p>
@@ -16710,16 +16374,53 @@
             </a:pPr>
             <a:r>
               <a:rPr lang="en-US" dirty="0"/>
-              <a:t>Load sample data into </a:t>
+              <a:t>Complete the chat interface modules to - </a:t>
+            </a:r>
+          </a:p>
+          <a:p>
+            <a:pPr marL="685800" lvl="1" indent="-457200">
+              <a:buFont typeface="Arial" panose="020B0604020202020204" pitchFamily="34" charset="0"/>
+              <a:buChar char="•"/>
+            </a:pPr>
+            <a:r>
+              <a:rPr lang="en-US" dirty="0"/>
+              <a:t>generate embeddings for user messages</a:t>
+            </a:r>
+          </a:p>
+          <a:p>
+            <a:pPr marL="685800" lvl="1" indent="-457200">
+              <a:buFont typeface="Arial" panose="020B0604020202020204" pitchFamily="34" charset="0"/>
+              <a:buChar char="•"/>
+            </a:pPr>
+            <a:r>
+              <a:rPr lang="en-US" dirty="0"/>
+              <a:t>Look up the Vector Index to retrieve the most relevant documents</a:t>
+            </a:r>
+          </a:p>
+          <a:p>
+            <a:pPr marL="685800" lvl="1" indent="-457200">
+              <a:buFont typeface="Arial" panose="020B0604020202020204" pitchFamily="34" charset="0"/>
+              <a:buChar char="•"/>
+            </a:pPr>
+            <a:r>
+              <a:rPr lang="en-US" dirty="0"/>
+              <a:t>Construct the System message, context and completion </a:t>
+            </a:r>
+          </a:p>
+          <a:p>
+            <a:pPr marL="685800" lvl="1" indent="-457200">
+              <a:buFont typeface="Arial" panose="020B0604020202020204" pitchFamily="34" charset="0"/>
+              <a:buChar char="•"/>
+            </a:pPr>
+            <a:r>
+              <a:rPr lang="en-US" dirty="0"/>
+              <a:t>Store the chat history in </a:t>
             </a:r>
             <a:r>
               <a:rPr lang="en-US" dirty="0" err="1"/>
               <a:t>CosmosDB</a:t>
             </a:r>
-            <a:r>
-              <a:rPr lang="en-US" dirty="0"/>
-              <a:t> using Data Migration tool</a:t>
-            </a:r>
+            <a:endParaRPr lang="en-US" dirty="0"/>
           </a:p>
           <a:p>
             <a:pPr marL="457200" indent="-457200">
@@ -16728,50 +16429,22 @@
             </a:pPr>
             <a:r>
               <a:rPr lang="en-US" dirty="0"/>
-              <a:t>Create a Vector index in Cognitive Search</a:t>
-            </a:r>
-          </a:p>
-          <a:p>
-            <a:pPr marL="457200" indent="-457200">
-              <a:buFont typeface="Arial" panose="020B0604020202020204" pitchFamily="34" charset="0"/>
-              <a:buChar char="•"/>
-            </a:pPr>
-            <a:r>
-              <a:rPr lang="en-US" dirty="0"/>
-              <a:t>Configure Change Feed on the customer and product collections to read the data, generate embeddings using OpenAI model and load into the index</a:t>
-            </a:r>
-          </a:p>
-          <a:p>
-            <a:pPr marL="457200" indent="-457200">
-              <a:buFont typeface="Arial" panose="020B0604020202020204" pitchFamily="34" charset="0"/>
-              <a:buChar char="•"/>
-            </a:pPr>
-            <a:r>
-              <a:rPr lang="en-US" dirty="0"/>
-              <a:t>Validate the index records</a:t>
-            </a:r>
-          </a:p>
-          <a:p>
-            <a:pPr marL="457200" indent="-457200">
-              <a:buFont typeface="Arial" panose="020B0604020202020204" pitchFamily="34" charset="0"/>
-              <a:buChar char="•"/>
-            </a:pPr>
+              <a:t>And finally, experiment with different Prompts to improve the responses</a:t>
+            </a:r>
+          </a:p>
+          <a:p>
             <a:endParaRPr lang="en-US" dirty="0"/>
           </a:p>
           <a:p>
             <a:r>
-              <a:rPr lang="en-US" sz="2000" dirty="0">
+              <a:rPr lang="en-US" sz="1800" dirty="0">
                 <a:hlinkClick r:id="rId3"/>
               </a:rPr>
-              <a:t>Build-Modern-AI-Apps-Hackathon/02-challenge02.md at main · Azure/Build-Modern-AI-Apps-Hackathon (github.com)</a:t>
-            </a:r>
-            <a:endParaRPr lang="en-US" sz="2000" dirty="0"/>
-          </a:p>
-          <a:p>
-            <a:pPr marL="457200" indent="-457200">
-              <a:buFont typeface="Arial" panose="020B0604020202020204" pitchFamily="34" charset="0"/>
-              <a:buChar char="•"/>
-            </a:pPr>
+              <a:t>https://github.com/Azure/Build-Modern-AI-Apps-Hackathon/blob/main/03-challenge03.md</a:t>
+            </a:r>
+            <a:endParaRPr lang="en-US" sz="1800" dirty="0"/>
+          </a:p>
+          <a:p>
             <a:endParaRPr lang="en-US" dirty="0"/>
           </a:p>
         </p:txBody>
@@ -16856,7 +16529,7 @@
         <p:spPr>
           <a:xfrm>
             <a:off x="586740" y="1513189"/>
-            <a:ext cx="11018520" cy="5022914"/>
+            <a:ext cx="11018520" cy="4018931"/>
           </a:xfrm>
         </p:spPr>
         <p:txBody>
@@ -16868,14 +16541,38 @@
               <a:buChar char="•"/>
             </a:pPr>
             <a:r>
-              <a:rPr lang="en-US" sz="2400" dirty="0"/>
-              <a:t>Cosmos DB Data Migration tool - </a:t>
-            </a:r>
-            <a:r>
-              <a:rPr lang="en-US" sz="2400" dirty="0">
+              <a:rPr lang="en-GB" sz="2400" dirty="0"/>
+              <a:t>Intro to Prompt Engineering - </a:t>
+            </a:r>
+            <a:r>
+              <a:rPr lang="en-GB" sz="2400" dirty="0">
                 <a:hlinkClick r:id="rId3"/>
               </a:rPr>
-              <a:t>Migrate data using the desktop data migration tool - Azure Cosmos DB | Microsoft Learn</a:t>
+              <a:t>https://learn.microsoft.com/en-us/azure/ai-services/openai/concepts/prompt-engineering</a:t>
+            </a:r>
+            <a:endParaRPr lang="en-GB" sz="2400" dirty="0"/>
+          </a:p>
+          <a:p>
+            <a:pPr marL="457200" indent="-457200">
+              <a:buFont typeface="Arial" panose="020B0604020202020204" pitchFamily="34" charset="0"/>
+              <a:buChar char="•"/>
+            </a:pPr>
+            <a:endParaRPr lang="en-GB" sz="2400" dirty="0"/>
+          </a:p>
+          <a:p>
+            <a:pPr marL="457200" indent="-457200">
+              <a:buFont typeface="Arial" panose="020B0604020202020204" pitchFamily="34" charset="0"/>
+              <a:buChar char="•"/>
+            </a:pPr>
+            <a:r>
+              <a:rPr lang="en-GB" sz="2400" dirty="0"/>
+              <a:t>Semantic Memory - </a:t>
+            </a:r>
+            <a:r>
+              <a:rPr lang="en-GB" sz="2400" dirty="0">
+                <a:hlinkClick r:id="rId4"/>
+              </a:rPr>
+              <a:t>https://learn.microsoft.com/en-us/semantic-kernel/memories/</a:t>
             </a:r>
             <a:endParaRPr lang="en-US" sz="2400" dirty="0"/>
           </a:p>
@@ -16892,16 +16589,16 @@
               <a:buChar char="•"/>
             </a:pPr>
             <a:r>
-              <a:rPr lang="en-GB" sz="2400" dirty="0"/>
-              <a:t>Semantic Kernel - </a:t>
+              <a:rPr lang="en-US" sz="2400" dirty="0"/>
+              <a:t>Cognitive Search Vector Index - </a:t>
             </a:r>
             <a:r>
               <a:rPr lang="en-GB" sz="2400" dirty="0">
-                <a:hlinkClick r:id="rId4"/>
+                <a:hlinkClick r:id="rId5"/>
               </a:rPr>
-              <a:t>Orchestrate your AI with Semantic Kernel | Microsoft Learn</a:t>
-            </a:r>
-            <a:endParaRPr lang="en-US" sz="2400" dirty="0"/>
+              <a:t>https://learn.microsoft.com/en-us/azure/search/vector-search-how-to-create-index</a:t>
+            </a:r>
+            <a:endParaRPr lang="en-GB" sz="2400" dirty="0"/>
           </a:p>
           <a:p>
             <a:pPr marL="457200" indent="-457200">
@@ -16909,55 +16606,6 @@
               <a:buChar char="•"/>
             </a:pPr>
             <a:endParaRPr lang="en-US" sz="2400" dirty="0"/>
-          </a:p>
-          <a:p>
-            <a:pPr marL="457200" indent="-457200">
-              <a:buFont typeface="Arial" panose="020B0604020202020204" pitchFamily="34" charset="0"/>
-              <a:buChar char="•"/>
-            </a:pPr>
-            <a:r>
-              <a:rPr lang="en-US" sz="2400" dirty="0"/>
-              <a:t>Cognitive Search Vector Index - </a:t>
-            </a:r>
-            <a:r>
-              <a:rPr lang="en-GB" sz="2400" dirty="0">
-                <a:hlinkClick r:id="rId5"/>
-              </a:rPr>
-              <a:t>Add vector search - Azure Cognitive Search | Microsoft Learn</a:t>
-            </a:r>
-            <a:endParaRPr lang="en-GB" sz="2400" dirty="0"/>
-          </a:p>
-          <a:p>
-            <a:pPr marL="457200" indent="-457200">
-              <a:buFont typeface="Arial" panose="020B0604020202020204" pitchFamily="34" charset="0"/>
-              <a:buChar char="•"/>
-            </a:pPr>
-            <a:endParaRPr lang="en-US" sz="2400" dirty="0"/>
-          </a:p>
-          <a:p>
-            <a:pPr marL="457200" indent="-457200">
-              <a:buFont typeface="Arial" panose="020B0604020202020204" pitchFamily="34" charset="0"/>
-              <a:buChar char="•"/>
-            </a:pPr>
-            <a:r>
-              <a:rPr lang="en-US" sz="2400" dirty="0"/>
-              <a:t>Change Feed in </a:t>
-            </a:r>
-            <a:r>
-              <a:rPr lang="en-US" sz="2400" dirty="0" err="1"/>
-              <a:t>CosmosDB</a:t>
-            </a:r>
-            <a:r>
-              <a:rPr lang="en-US" sz="2400" dirty="0"/>
-              <a:t> - </a:t>
-            </a:r>
-            <a:r>
-              <a:rPr lang="en-GB" sz="2400" dirty="0">
-                <a:hlinkClick r:id="rId6"/>
-              </a:rPr>
-              <a:t>Working with the change feed - Azure Cosmos DB | Microsoft Learn</a:t>
-            </a:r>
-            <a:endParaRPr lang="en-GB" sz="2400" dirty="0"/>
           </a:p>
           <a:p>
             <a:pPr marL="457200" indent="-457200">
@@ -17054,8 +16702,8 @@
         </p:nvSpPr>
         <p:spPr>
           <a:xfrm>
-            <a:off x="588263" y="1218470"/>
-            <a:ext cx="11453210" cy="5958554"/>
+            <a:off x="348647" y="1172750"/>
+            <a:ext cx="11584273" cy="6457152"/>
           </a:xfrm>
         </p:spPr>
         <p:txBody>
@@ -17067,9 +16715,10 @@
               <a:buAutoNum type="arabicPeriod"/>
             </a:pPr>
             <a:r>
-              <a:rPr lang="en-US" sz="2400" dirty="0"/>
-              <a:t>Configure and run the Data Migration tool</a:t>
-            </a:r>
+              <a:rPr lang="en-GB" sz="2400" dirty="0"/>
+              <a:t>Build the memories section of the prompt and the System Message</a:t>
+            </a:r>
+            <a:endParaRPr lang="en-US" sz="2400" dirty="0"/>
           </a:p>
           <a:p>
             <a:pPr marL="514350" lvl="1" indent="-285750">
@@ -17077,16 +16726,32 @@
               <a:buChar char="ü"/>
             </a:pPr>
             <a:r>
-              <a:rPr lang="en-US" sz="1800" dirty="0"/>
-              <a:t>Copy the contents of </a:t>
-            </a:r>
-            <a:r>
-              <a:rPr lang="en-US" sz="1800" dirty="0" err="1"/>
-              <a:t>migrationsetting.template.json</a:t>
-            </a:r>
-            <a:r>
-              <a:rPr lang="en-US" sz="1800" dirty="0"/>
-              <a:t> provided in the repository and replace the same file located in the downloaded DMT folder.</a:t>
+              <a:rPr lang="en-US" sz="1600" dirty="0"/>
+              <a:t>Format the System Message – “</a:t>
+            </a:r>
+            <a:r>
+              <a:rPr lang="en-US" sz="1600" dirty="0" err="1"/>
+              <a:t>systemMessage</a:t>
+            </a:r>
+            <a:r>
+              <a:rPr lang="en-US" sz="1600" dirty="0"/>
+              <a:t> newline </a:t>
+            </a:r>
+            <a:r>
+              <a:rPr lang="en-US" sz="1600" dirty="0" err="1"/>
+              <a:t>newline</a:t>
+            </a:r>
+            <a:r>
+              <a:rPr lang="en-US" sz="1600" dirty="0"/>
+              <a:t> </a:t>
+            </a:r>
+            <a:r>
+              <a:rPr lang="en-US" sz="1600" dirty="0" err="1"/>
+              <a:t>memoriesPrompt</a:t>
+            </a:r>
+            <a:r>
+              <a:rPr lang="en-US" sz="1600" dirty="0"/>
+              <a:t>”</a:t>
             </a:r>
           </a:p>
           <a:p>
@@ -17095,50 +16760,46 @@
               <a:buChar char="ü"/>
             </a:pPr>
             <a:r>
-              <a:rPr lang="en-US" sz="1800" dirty="0"/>
-              <a:t>Replace the </a:t>
-            </a:r>
-            <a:r>
-              <a:rPr lang="en-US" sz="1800" b="0" i="0" dirty="0">
-                <a:solidFill>
-                  <a:srgbClr val="ADBAC7"/>
-                </a:solidFill>
-                <a:effectLst/>
-                <a:latin typeface="ui-monospace"/>
-              </a:rPr>
-              <a:t>{{</a:t>
-            </a:r>
-            <a:r>
-              <a:rPr lang="en-US" sz="1800" b="0" i="0" dirty="0" err="1">
-                <a:solidFill>
-                  <a:srgbClr val="ADBAC7"/>
-                </a:solidFill>
-                <a:effectLst/>
-                <a:latin typeface="ui-monospace"/>
-              </a:rPr>
-              <a:t>cosmosConnectionString</a:t>
-            </a:r>
-            <a:r>
-              <a:rPr lang="en-US" sz="1800" b="0" i="0" dirty="0">
-                <a:solidFill>
-                  <a:srgbClr val="ADBAC7"/>
-                </a:solidFill>
-                <a:effectLst/>
-                <a:latin typeface="ui-monospace"/>
-              </a:rPr>
-              <a:t>}} </a:t>
-            </a:r>
-            <a:r>
-              <a:rPr lang="en-US" sz="1800" dirty="0"/>
-              <a:t>instances with appropriate value and run the migration tool</a:t>
-            </a:r>
-          </a:p>
-          <a:p>
-            <a:pPr marL="685800" lvl="1" indent="-457200">
-              <a:buFont typeface="Arial" panose="020B0604020202020204" pitchFamily="34" charset="0"/>
-              <a:buChar char="•"/>
+              <a:rPr lang="en-US" sz="1600" dirty="0"/>
+              <a:t>Add the user and system messages to the chat history object with proper role</a:t>
+            </a:r>
+          </a:p>
+          <a:p>
+            <a:pPr marL="514350" lvl="1" indent="-285750">
+              <a:buFont typeface="Wingdings" panose="05000000000000000000" pitchFamily="2" charset="2"/>
+              <a:buChar char="ü"/>
             </a:pPr>
-            <a:endParaRPr lang="en-US" sz="1800" dirty="0"/>
+            <a:r>
+              <a:rPr lang="en-US" sz="1600" dirty="0"/>
+              <a:t>Complete the code in </a:t>
+            </a:r>
+            <a:r>
+              <a:rPr lang="en-US" sz="1600" i="1" dirty="0" err="1"/>
+              <a:t>ChatBuilder.cs</a:t>
+            </a:r>
+            <a:r>
+              <a:rPr lang="en-US" sz="1600" dirty="0"/>
+              <a:t> located in </a:t>
+            </a:r>
+            <a:r>
+              <a:rPr lang="en-US" sz="1600" i="1" dirty="0" err="1"/>
+              <a:t>VectorSearchAiAssistant.SemanticKernel</a:t>
+            </a:r>
+            <a:r>
+              <a:rPr lang="en-US" sz="1600" i="1" dirty="0"/>
+              <a:t> </a:t>
+            </a:r>
+            <a:r>
+              <a:rPr lang="en-US" sz="1600" dirty="0"/>
+              <a:t>project</a:t>
+            </a:r>
+          </a:p>
+          <a:p>
+            <a:pPr marL="514350" lvl="1" indent="-285750">
+              <a:buFont typeface="Wingdings" panose="05000000000000000000" pitchFamily="2" charset="2"/>
+              <a:buChar char="ü"/>
+            </a:pPr>
+            <a:endParaRPr lang="en-US" sz="1600" dirty="0"/>
           </a:p>
           <a:p>
             <a:pPr marL="514350" indent="-514350">
@@ -17146,8 +16807,8 @@
               <a:buAutoNum type="arabicPeriod"/>
             </a:pPr>
             <a:r>
-              <a:rPr lang="en-US" sz="2400" dirty="0"/>
-              <a:t>Create the Cognitive Search Index with Vector Configuration</a:t>
+              <a:rPr lang="en-GB" sz="2400" dirty="0"/>
+              <a:t>Receive a prompt from a user, vectorize it and get a completion from the OpenAI service</a:t>
             </a:r>
           </a:p>
           <a:p>
@@ -17156,132 +16817,123 @@
               <a:buChar char="ü"/>
             </a:pPr>
             <a:r>
-              <a:rPr lang="en-US" sz="1800" dirty="0"/>
+              <a:rPr lang="en-GB" sz="1600" dirty="0"/>
+              <a:t>Generate the completion to return to the user, and store the prompt and response history in </a:t>
+            </a:r>
+            <a:r>
+              <a:rPr lang="en-GB" sz="1600" dirty="0" err="1"/>
+              <a:t>CosmosDB</a:t>
+            </a:r>
+            <a:endParaRPr lang="en-GB" sz="1600" dirty="0"/>
+          </a:p>
+          <a:p>
+            <a:pPr marL="742950" lvl="1" indent="-514350">
+              <a:buFont typeface="Wingdings" panose="05000000000000000000" pitchFamily="2" charset="2"/>
+              <a:buChar char="ü"/>
+            </a:pPr>
+            <a:r>
+              <a:rPr lang="en-US" sz="1600" dirty="0"/>
               <a:t>Complete the code in </a:t>
             </a:r>
             <a:r>
-              <a:rPr lang="en-US" sz="1800" i="1" dirty="0" err="1"/>
-              <a:t>AzureCognitiveSearchVectorMemory.cs</a:t>
-            </a:r>
-            <a:r>
-              <a:rPr lang="en-US" sz="1800" dirty="0"/>
-              <a:t> file located in the </a:t>
-            </a:r>
-            <a:r>
-              <a:rPr lang="en-US" sz="1800" i="1" dirty="0" err="1"/>
-              <a:t>VectorSearchAiAssistant.SemanticKernel</a:t>
-            </a:r>
-            <a:r>
-              <a:rPr lang="en-US" sz="1800" i="1" dirty="0"/>
+              <a:rPr lang="en-US" sz="1600" i="1" dirty="0" err="1"/>
+              <a:t>ChatService.cs</a:t>
+            </a:r>
+            <a:r>
+              <a:rPr lang="en-US" sz="1600" dirty="0"/>
+              <a:t> located in </a:t>
+            </a:r>
+            <a:r>
+              <a:rPr lang="en-US" sz="1600" i="1" dirty="0" err="1"/>
+              <a:t>VectorSearchAiAssistant.Service</a:t>
+            </a:r>
+            <a:r>
+              <a:rPr lang="en-US" sz="1600" i="1" dirty="0"/>
               <a:t> </a:t>
             </a:r>
             <a:r>
-              <a:rPr lang="en-US" sz="1800" dirty="0"/>
+              <a:rPr lang="en-US" sz="1600" dirty="0"/>
               <a:t>project</a:t>
             </a:r>
-          </a:p>
-          <a:p>
-            <a:pPr marL="742950" lvl="1" indent="-514350">
-              <a:buFont typeface="Arial" panose="020B0604020202020204" pitchFamily="34" charset="0"/>
-              <a:buChar char="•"/>
-            </a:pPr>
+            <a:endParaRPr lang="en-GB" sz="1600" dirty="0"/>
+          </a:p>
+          <a:p>
+            <a:pPr lvl="1"/>
             <a:endParaRPr lang="en-US" sz="1800" dirty="0"/>
           </a:p>
           <a:p>
-            <a:pPr marL="457200" indent="-457200">
+            <a:pPr marL="342900" indent="-342900">
               <a:buFont typeface="+mj-lt"/>
               <a:buAutoNum type="arabicPeriod"/>
             </a:pPr>
             <a:r>
-              <a:rPr lang="en-US" sz="2400" dirty="0"/>
-              <a:t> Configure </a:t>
-            </a:r>
-            <a:r>
-              <a:rPr lang="en-US" sz="2400" dirty="0" err="1"/>
-              <a:t>ChangeFeed</a:t>
-            </a:r>
-            <a:r>
-              <a:rPr lang="en-US" sz="2400" dirty="0"/>
-              <a:t> on </a:t>
-            </a:r>
-            <a:r>
-              <a:rPr lang="en-US" sz="2400" dirty="0" err="1"/>
-              <a:t>CosmosDB</a:t>
-            </a:r>
-            <a:r>
-              <a:rPr lang="en-US" sz="2400" dirty="0"/>
-              <a:t> containers</a:t>
-            </a:r>
-          </a:p>
-          <a:p>
-            <a:pPr marL="685800" lvl="1" indent="-457200">
+              <a:rPr lang="en-US" sz="2600" dirty="0"/>
+              <a:t>Bring it all together!</a:t>
+            </a:r>
+          </a:p>
+          <a:p>
+            <a:pPr marL="571500" lvl="1" indent="-342900">
               <a:buFont typeface="Wingdings" panose="05000000000000000000" pitchFamily="2" charset="2"/>
               <a:buChar char="ü"/>
             </a:pPr>
             <a:r>
-              <a:rPr lang="en-US" sz="1800" dirty="0"/>
+              <a:rPr lang="en-US" sz="1600" dirty="0"/>
               <a:t>Complete the code in </a:t>
             </a:r>
             <a:r>
-              <a:rPr lang="en-US" sz="1800" dirty="0" err="1"/>
-              <a:t>CosmosDbService</a:t>
-            </a:r>
-            <a:r>
-              <a:rPr lang="en-US" sz="1800" i="1" dirty="0" err="1"/>
+              <a:rPr lang="en-US" sz="1600" dirty="0" err="1"/>
+              <a:t>SemanticKernelRAGService</a:t>
+            </a:r>
+            <a:r>
+              <a:rPr lang="en-US" sz="1600" i="1" dirty="0" err="1"/>
               <a:t>.cs</a:t>
             </a:r>
             <a:r>
-              <a:rPr lang="en-US" sz="1800" dirty="0"/>
-              <a:t> file located in the </a:t>
-            </a:r>
-            <a:r>
-              <a:rPr lang="en-US" sz="1800" i="1" dirty="0" err="1"/>
+              <a:rPr lang="en-US" sz="1600" dirty="0"/>
+              <a:t> located in </a:t>
+            </a:r>
+            <a:r>
+              <a:rPr lang="en-US" sz="1600" i="1" dirty="0" err="1"/>
               <a:t>VectorSearchAiAssistant.Service</a:t>
             </a:r>
             <a:r>
-              <a:rPr lang="en-US" sz="1800" i="1" dirty="0"/>
+              <a:rPr lang="en-US" sz="1600" i="1" dirty="0"/>
               <a:t> </a:t>
             </a:r>
             <a:r>
-              <a:rPr lang="en-US" sz="1800" dirty="0"/>
+              <a:rPr lang="en-US" sz="1600" dirty="0"/>
               <a:t>project</a:t>
             </a:r>
           </a:p>
           <a:p>
+            <a:pPr marL="571500" lvl="1" indent="-342900">
+              <a:buFont typeface="Wingdings" panose="05000000000000000000" pitchFamily="2" charset="2"/>
+              <a:buChar char="ü"/>
+            </a:pPr>
+            <a:endParaRPr lang="en-US" sz="1800" dirty="0"/>
+          </a:p>
+          <a:p>
+            <a:r>
+              <a:rPr lang="en-US" sz="2600" dirty="0"/>
+              <a:t>4. Prompt Engineering</a:t>
+            </a:r>
+          </a:p>
+          <a:p>
             <a:pPr lvl="1"/>
-            <a:endParaRPr lang="en-US" dirty="0"/>
-          </a:p>
-          <a:p>
-            <a:pPr lvl="1"/>
-            <a:r>
-              <a:rPr lang="en-US" dirty="0"/>
+            <a:r>
+              <a:rPr lang="en-US" sz="1400" dirty="0"/>
               <a:t>Refer - </a:t>
             </a:r>
             <a:r>
-              <a:rPr lang="en-US" dirty="0">
+              <a:rPr lang="en-US" sz="1400" dirty="0">
                 <a:hlinkClick r:id="rId3"/>
               </a:rPr>
-              <a:t>hackathon-content/hackathon-guides/build-modern-ai-apps/challenge-solutions/challenge-02/challenge-02.md at main · </a:t>
-            </a:r>
-            <a:r>
-              <a:rPr lang="en-US" dirty="0" err="1">
-                <a:hlinkClick r:id="rId3"/>
-              </a:rPr>
-              <a:t>AzureCosmosDB</a:t>
-            </a:r>
-            <a:r>
-              <a:rPr lang="en-US" dirty="0">
-                <a:hlinkClick r:id="rId3"/>
-              </a:rPr>
-              <a:t>/hackathon-content (github.com)</a:t>
-            </a:r>
-            <a:endParaRPr lang="en-US" dirty="0"/>
-          </a:p>
-          <a:p>
-            <a:pPr marL="685800" lvl="1" indent="-457200">
-              <a:buFont typeface="Arial" panose="020B0604020202020204" pitchFamily="34" charset="0"/>
-              <a:buChar char="•"/>
-            </a:pPr>
+              <a:t>https://github.com/AzureCosmosDB/hackathon-content/blob/main/hackathon-guides/build-modern-ai-apps/challenge-solutions/challenge-03/challenge-03.md</a:t>
+            </a:r>
+            <a:endParaRPr lang="en-US" sz="1400" dirty="0"/>
+          </a:p>
+          <a:p>
+            <a:pPr lvl="1"/>
             <a:endParaRPr lang="en-US" dirty="0"/>
           </a:p>
           <a:p>
@@ -17375,128 +17027,6 @@
 </file>
 
 <file path=ppt/slides/slide6.xml><?xml version="1.0" encoding="utf-8"?>
-<p:sld xmlns:a="http://schemas.openxmlformats.org/drawingml/2006/main" xmlns:r="http://schemas.openxmlformats.org/officeDocument/2006/relationships" xmlns:p="http://schemas.openxmlformats.org/presentationml/2006/main">
-  <p:cSld>
-    <p:spTree>
-      <p:nvGrpSpPr>
-        <p:cNvPr id="1" name=""/>
-        <p:cNvGrpSpPr/>
-        <p:nvPr/>
-      </p:nvGrpSpPr>
-      <p:grpSpPr>
-        <a:xfrm>
-          <a:off x="0" y="0"/>
-          <a:ext cx="0" cy="0"/>
-          <a:chOff x="0" y="0"/>
-          <a:chExt cx="0" cy="0"/>
-        </a:xfrm>
-      </p:grpSpPr>
-      <p:sp>
-        <p:nvSpPr>
-          <p:cNvPr id="2" name="Title 1">
-            <a:extLst>
-              <a:ext uri="{FF2B5EF4-FFF2-40B4-BE49-F238E27FC236}">
-                <a16:creationId xmlns:a16="http://schemas.microsoft.com/office/drawing/2014/main" id="{7D8D856E-EA3A-69F8-8314-B6BA9F63A366}"/>
-              </a:ext>
-            </a:extLst>
-          </p:cNvPr>
-          <p:cNvSpPr>
-            <a:spLocks noGrp="1"/>
-          </p:cNvSpPr>
-          <p:nvPr>
-            <p:ph type="title"/>
-          </p:nvPr>
-        </p:nvSpPr>
-        <p:spPr/>
-        <p:txBody>
-          <a:bodyPr/>
-          <a:lstStyle/>
-          <a:p>
-            <a:r>
-              <a:rPr lang="en-US"/>
-              <a:t>Additional References</a:t>
-            </a:r>
-            <a:endParaRPr lang="en-US" dirty="0"/>
-          </a:p>
-        </p:txBody>
-      </p:sp>
-      <p:sp>
-        <p:nvSpPr>
-          <p:cNvPr id="3" name="Text Placeholder 2">
-            <a:extLst>
-              <a:ext uri="{FF2B5EF4-FFF2-40B4-BE49-F238E27FC236}">
-                <a16:creationId xmlns:a16="http://schemas.microsoft.com/office/drawing/2014/main" id="{B6AD5848-BE06-4F51-059F-8680CA5E35E0}"/>
-              </a:ext>
-            </a:extLst>
-          </p:cNvPr>
-          <p:cNvSpPr>
-            <a:spLocks noGrp="1"/>
-          </p:cNvSpPr>
-          <p:nvPr>
-            <p:ph type="body" sz="quarter" idx="10"/>
-          </p:nvPr>
-        </p:nvSpPr>
-        <p:spPr>
-          <a:xfrm>
-            <a:off x="586390" y="1434370"/>
-            <a:ext cx="11018520" cy="2499146"/>
-          </a:xfrm>
-        </p:spPr>
-        <p:txBody>
-          <a:bodyPr/>
-          <a:lstStyle/>
-          <a:p>
-            <a:r>
-              <a:rPr lang="en-US" dirty="0">
-                <a:hlinkClick r:id="rId2"/>
-              </a:rPr>
-              <a:t>LLM AI Embeddings | Microsoft Learn</a:t>
-            </a:r>
-            <a:endParaRPr lang="en-US" dirty="0"/>
-          </a:p>
-          <a:p>
-            <a:endParaRPr lang="en-US" dirty="0"/>
-          </a:p>
-          <a:p>
-            <a:r>
-              <a:rPr lang="en-US" dirty="0">
-                <a:hlinkClick r:id="rId3"/>
-              </a:rPr>
-              <a:t>Vector Database | Microsoft Learn</a:t>
-            </a:r>
-            <a:endParaRPr lang="en-US" dirty="0"/>
-          </a:p>
-          <a:p>
-            <a:endParaRPr lang="en-US" dirty="0"/>
-          </a:p>
-          <a:p>
-            <a:r>
-              <a:rPr lang="en-US" dirty="0">
-                <a:hlinkClick r:id="rId4"/>
-              </a:rPr>
-              <a:t>RAG and generative AI - Azure Cognitive Search | Microsoft Learn</a:t>
-            </a:r>
-            <a:endParaRPr lang="en-US" dirty="0"/>
-          </a:p>
-        </p:txBody>
-      </p:sp>
-    </p:spTree>
-    <p:extLst>
-      <p:ext uri="{BB962C8B-B14F-4D97-AF65-F5344CB8AC3E}">
-        <p14:creationId xmlns:p14="http://schemas.microsoft.com/office/powerpoint/2010/main" val="1720178716"/>
-      </p:ext>
-    </p:extLst>
-  </p:cSld>
-  <p:clrMapOvr>
-    <a:masterClrMapping/>
-  </p:clrMapOvr>
-  <p:transition>
-    <p:fade/>
-  </p:transition>
-</p:sld>
-</file>
-
-<file path=ppt/slides/slide7.xml><?xml version="1.0" encoding="utf-8"?>
 <p:sld xmlns:a="http://schemas.openxmlformats.org/drawingml/2006/main" xmlns:r="http://schemas.openxmlformats.org/officeDocument/2006/relationships" xmlns:p="http://schemas.openxmlformats.org/presentationml/2006/main">
   <p:cSld>
     <p:spTree>
@@ -18430,6 +17960,42 @@
 </file>
 
 <file path=customXml/item1.xml><?xml version="1.0" encoding="utf-8"?>
+<?mso-contentType ?>
+<FormTemplates xmlns="http://schemas.microsoft.com/sharepoint/v3/contenttype/forms">
+  <Display>DocumentLibraryForm</Display>
+  <Edit>DocumentLibraryForm</Edit>
+  <New>DocumentLibraryForm</New>
+</FormTemplates>
+</file>
+
+<file path=customXml/item2.xml><?xml version="1.0" encoding="utf-8"?>
+<p:properties xmlns:p="http://schemas.microsoft.com/office/2006/metadata/properties" xmlns:xsi="http://www.w3.org/2001/XMLSchema-instance" xmlns:pc="http://schemas.microsoft.com/office/infopath/2007/PartnerControls">
+  <documentManagement>
+    <MediaServiceKeyPoints xmlns="675661ce-a921-4ef4-be83-dd19f3c4cc86" xsi:nil="true"/>
+    <MaterialType xmlns="675661ce-a921-4ef4-be83-dd19f3c4cc86">
+      <Value>Presentation Ready Deck</Value>
+    </MaterialType>
+    <Description xmlns="675661ce-a921-4ef4-be83-dd19f3c4cc86" xsi:nil="true"/>
+    <Tag xmlns="675661ce-a921-4ef4-be83-dd19f3c4cc86">
+      <Value>PM</Value>
+      <Value>Lead Coach</Value>
+      <Value>Coach</Value>
+    </Tag>
+    <OHOrder xmlns="675661ce-a921-4ef4-be83-dd19f3c4cc86" xsi:nil="true"/>
+    <Internal_x0020_MSFT xmlns="675661ce-a921-4ef4-be83-dd19f3c4cc86" xsi:nil="true"/>
+    <OrderNo_x002e_ xmlns="675661ce-a921-4ef4-be83-dd19f3c4cc86" xsi:nil="true"/>
+    <Sequence_x0020_of_x0020_Material xmlns="675661ce-a921-4ef4-be83-dd19f3c4cc86">4. Day of Event</Sequence_x0020_of_x0020_Material>
+    <_ip_UnifiedCompliancePolicyUIAction xmlns="http://schemas.microsoft.com/sharepoint/v3" xsi:nil="true"/>
+    <_ip_UnifiedCompliancePolicyProperties xmlns="http://schemas.microsoft.com/sharepoint/v3" xsi:nil="true"/>
+    <lcf76f155ced4ddcb4097134ff3c332f xmlns="675661ce-a921-4ef4-be83-dd19f3c4cc86">
+      <Terms xmlns="http://schemas.microsoft.com/office/infopath/2007/PartnerControls"/>
+    </lcf76f155ced4ddcb4097134ff3c332f>
+    <TaxCatchAll xmlns="230e9df3-be65-4c73-a93b-d1236ebd677e" xsi:nil="true"/>
+  </documentManagement>
+</p:properties>
+</file>
+
+<file path=customXml/item3.xml><?xml version="1.0" encoding="utf-8"?>
 <ct:contentTypeSchema xmlns:ct="http://schemas.microsoft.com/office/2006/metadata/contentType" xmlns:ma="http://schemas.microsoft.com/office/2006/metadata/properties/metaAttributes" ct:_="" ma:_="" ma:contentTypeName="Document" ma:contentTypeID="0x010100262D61D9A00A5041B210DE23A0FE8625" ma:contentTypeVersion="24" ma:contentTypeDescription="Create a new document." ma:contentTypeScope="" ma:versionID="839773bd44a51a311d8e2846b7142e4b">
   <xsd:schema xmlns:xsd="http://www.w3.org/2001/XMLSchema" xmlns:xs="http://www.w3.org/2001/XMLSchema" xmlns:p="http://schemas.microsoft.com/office/2006/metadata/properties" xmlns:ns1="http://schemas.microsoft.com/sharepoint/v3" xmlns:ns2="675661ce-a921-4ef4-be83-dd19f3c4cc86" xmlns:ns3="4343a8c8-d2d9-429e-8dd3-28f02b2ba4f5" xmlns:ns4="230e9df3-be65-4c73-a93b-d1236ebd677e" targetNamespace="http://schemas.microsoft.com/office/2006/metadata/properties" ma:root="true" ma:fieldsID="7f43399919387af8e2a3ad2b19a547db" ns1:_="" ns2:_="" ns3:_="" ns4:_="">
     <xsd:import namespace="http://schemas.microsoft.com/sharepoint/v3"/>
@@ -18769,59 +18335,10 @@
 </ct:contentTypeSchema>
 </file>
 
-<file path=customXml/item2.xml><?xml version="1.0" encoding="utf-8"?>
-<p:properties xmlns:p="http://schemas.microsoft.com/office/2006/metadata/properties" xmlns:xsi="http://www.w3.org/2001/XMLSchema-instance" xmlns:pc="http://schemas.microsoft.com/office/infopath/2007/PartnerControls">
-  <documentManagement>
-    <MediaServiceKeyPoints xmlns="675661ce-a921-4ef4-be83-dd19f3c4cc86" xsi:nil="true"/>
-    <MaterialType xmlns="675661ce-a921-4ef4-be83-dd19f3c4cc86">
-      <Value>Presentation Ready Deck</Value>
-    </MaterialType>
-    <Description xmlns="675661ce-a921-4ef4-be83-dd19f3c4cc86" xsi:nil="true"/>
-    <Tag xmlns="675661ce-a921-4ef4-be83-dd19f3c4cc86">
-      <Value>PM</Value>
-      <Value>Lead Coach</Value>
-      <Value>Coach</Value>
-    </Tag>
-    <OHOrder xmlns="675661ce-a921-4ef4-be83-dd19f3c4cc86" xsi:nil="true"/>
-    <Internal_x0020_MSFT xmlns="675661ce-a921-4ef4-be83-dd19f3c4cc86" xsi:nil="true"/>
-    <OrderNo_x002e_ xmlns="675661ce-a921-4ef4-be83-dd19f3c4cc86" xsi:nil="true"/>
-    <Sequence_x0020_of_x0020_Material xmlns="675661ce-a921-4ef4-be83-dd19f3c4cc86">4. Day of Event</Sequence_x0020_of_x0020_Material>
-    <_ip_UnifiedCompliancePolicyUIAction xmlns="http://schemas.microsoft.com/sharepoint/v3" xsi:nil="true"/>
-    <_ip_UnifiedCompliancePolicyProperties xmlns="http://schemas.microsoft.com/sharepoint/v3" xsi:nil="true"/>
-    <lcf76f155ced4ddcb4097134ff3c332f xmlns="675661ce-a921-4ef4-be83-dd19f3c4cc86">
-      <Terms xmlns="http://schemas.microsoft.com/office/infopath/2007/PartnerControls"/>
-    </lcf76f155ced4ddcb4097134ff3c332f>
-    <TaxCatchAll xmlns="230e9df3-be65-4c73-a93b-d1236ebd677e" xsi:nil="true"/>
-  </documentManagement>
-</p:properties>
-</file>
-
-<file path=customXml/item3.xml><?xml version="1.0" encoding="utf-8"?>
-<?mso-contentType ?>
-<FormTemplates xmlns="http://schemas.microsoft.com/sharepoint/v3/contenttype/forms">
-  <Display>DocumentLibraryForm</Display>
-  <Edit>DocumentLibraryForm</Edit>
-  <New>DocumentLibraryForm</New>
-</FormTemplates>
-</file>
-
 <file path=customXml/itemProps1.xml><?xml version="1.0" encoding="utf-8"?>
-<ds:datastoreItem xmlns:ds="http://schemas.openxmlformats.org/officeDocument/2006/customXml" ds:itemID="{D1157EB0-1AB2-459D-92B4-E00E8DCC06DF}">
+<ds:datastoreItem xmlns:ds="http://schemas.openxmlformats.org/officeDocument/2006/customXml" ds:itemID="{91696345-23F8-4CDB-8A31-BEF0BEB16805}">
   <ds:schemaRefs>
-    <ds:schemaRef ds:uri="http://schemas.microsoft.com/office/2006/metadata/contentType"/>
-    <ds:schemaRef ds:uri="http://schemas.microsoft.com/office/2006/metadata/properties/metaAttributes"/>
-    <ds:schemaRef ds:uri="http://www.w3.org/2001/XMLSchema"/>
-    <ds:schemaRef ds:uri="http://schemas.microsoft.com/office/2006/metadata/properties"/>
-    <ds:schemaRef ds:uri="http://schemas.microsoft.com/sharepoint/v3"/>
-    <ds:schemaRef ds:uri="675661ce-a921-4ef4-be83-dd19f3c4cc86"/>
-    <ds:schemaRef ds:uri="4343a8c8-d2d9-429e-8dd3-28f02b2ba4f5"/>
-    <ds:schemaRef ds:uri="230e9df3-be65-4c73-a93b-d1236ebd677e"/>
-    <ds:schemaRef ds:uri="http://schemas.microsoft.com/office/2006/documentManagement/types"/>
-    <ds:schemaRef ds:uri="http://schemas.microsoft.com/office/infopath/2007/PartnerControls"/>
-    <ds:schemaRef ds:uri="http://schemas.openxmlformats.org/package/2006/metadata/core-properties"/>
-    <ds:schemaRef ds:uri="http://purl.org/dc/elements/1.1/"/>
-    <ds:schemaRef ds:uri="http://purl.org/dc/terms/"/>
-    <ds:schemaRef ds:uri="http://schemas.microsoft.com/internal/obd"/>
+    <ds:schemaRef ds:uri="http://schemas.microsoft.com/sharepoint/v3/contenttype/forms"/>
   </ds:schemaRefs>
 </ds:datastoreItem>
 </file>
@@ -18846,9 +18363,22 @@
 </file>
 
 <file path=customXml/itemProps3.xml><?xml version="1.0" encoding="utf-8"?>
-<ds:datastoreItem xmlns:ds="http://schemas.openxmlformats.org/officeDocument/2006/customXml" ds:itemID="{91696345-23F8-4CDB-8A31-BEF0BEB16805}">
+<ds:datastoreItem xmlns:ds="http://schemas.openxmlformats.org/officeDocument/2006/customXml" ds:itemID="{D1157EB0-1AB2-459D-92B4-E00E8DCC06DF}">
   <ds:schemaRefs>
-    <ds:schemaRef ds:uri="http://schemas.microsoft.com/sharepoint/v3/contenttype/forms"/>
+    <ds:schemaRef ds:uri="http://schemas.microsoft.com/office/2006/metadata/contentType"/>
+    <ds:schemaRef ds:uri="http://schemas.microsoft.com/office/2006/metadata/properties/metaAttributes"/>
+    <ds:schemaRef ds:uri="http://www.w3.org/2001/XMLSchema"/>
+    <ds:schemaRef ds:uri="http://schemas.microsoft.com/office/2006/metadata/properties"/>
+    <ds:schemaRef ds:uri="http://schemas.microsoft.com/sharepoint/v3"/>
+    <ds:schemaRef ds:uri="675661ce-a921-4ef4-be83-dd19f3c4cc86"/>
+    <ds:schemaRef ds:uri="4343a8c8-d2d9-429e-8dd3-28f02b2ba4f5"/>
+    <ds:schemaRef ds:uri="230e9df3-be65-4c73-a93b-d1236ebd677e"/>
+    <ds:schemaRef ds:uri="http://schemas.microsoft.com/office/2006/documentManagement/types"/>
+    <ds:schemaRef ds:uri="http://schemas.microsoft.com/office/infopath/2007/PartnerControls"/>
+    <ds:schemaRef ds:uri="http://schemas.openxmlformats.org/package/2006/metadata/core-properties"/>
+    <ds:schemaRef ds:uri="http://purl.org/dc/elements/1.1/"/>
+    <ds:schemaRef ds:uri="http://purl.org/dc/terms/"/>
+    <ds:schemaRef ds:uri="http://schemas.microsoft.com/internal/obd"/>
   </ds:schemaRefs>
 </ds:datastoreItem>
 </file>

</xml_diff>